<commit_message>
[R-A-01] Fix color coding
Purple had the wrong RGB value, no wonder it didn't show properly.
</commit_message>
<xml_diff>
--- a/rust-advanced/01 - Introduction/01 - original.pptx
+++ b/rust-advanced/01 - Introduction/01 - original.pptx
@@ -400,7 +400,7 @@
           <a:p>
             <a:fld id="{1B342190-87B4-42CD-9E06-8495AA5167A0}" type="datetimeFigureOut">
               <a:rPr lang="de-DE" smtClean="0"/>
-              <a:t>21.04.2024</a:t>
+              <a:t>01.05.2024</a:t>
             </a:fld>
             <a:endParaRPr lang="de-DE"/>
           </a:p>
@@ -1302,7 +1302,7 @@
           <a:p>
             <a:fld id="{B3A429D2-1402-443B-84A2-2FCD82AF0188}" type="datetime1">
               <a:rPr lang="de-DE" smtClean="0"/>
-              <a:t>21.04.2024</a:t>
+              <a:t>01.05.2024</a:t>
             </a:fld>
             <a:endParaRPr lang="de-DE"/>
           </a:p>
@@ -2527,7 +2527,7 @@
           <a:p>
             <a:fld id="{AC4288CD-B084-4B85-A01A-2AA2761376DD}" type="datetime1">
               <a:rPr lang="de-DE" smtClean="0"/>
-              <a:t>21.04.2024</a:t>
+              <a:t>01.05.2024</a:t>
             </a:fld>
             <a:endParaRPr lang="de-DE"/>
           </a:p>
@@ -2685,7 +2685,7 @@
           <a:p>
             <a:fld id="{B207BD3A-A673-4564-87D3-514428F41E43}" type="datetime1">
               <a:rPr lang="de-DE" smtClean="0"/>
-              <a:t>21.04.2024</a:t>
+              <a:t>01.05.2024</a:t>
             </a:fld>
             <a:endParaRPr lang="de-DE"/>
           </a:p>
@@ -3779,7 +3779,7 @@
           <a:p>
             <a:fld id="{1A9B8912-EBFE-4D90-8198-A8C4E94CF400}" type="datetime1">
               <a:rPr lang="de-DE" smtClean="0"/>
-              <a:t>21.04.2024</a:t>
+              <a:t>01.05.2024</a:t>
             </a:fld>
             <a:endParaRPr lang="de-DE"/>
           </a:p>
@@ -4302,7 +4302,7 @@
           <a:p>
             <a:fld id="{E8277138-AE99-4B23-B221-2DCA1A62B56B}" type="datetime1">
               <a:rPr lang="de-DE" smtClean="0"/>
-              <a:t>21.04.2024</a:t>
+              <a:t>01.05.2024</a:t>
             </a:fld>
             <a:endParaRPr lang="de-DE"/>
           </a:p>
@@ -4958,7 +4958,7 @@
           <a:p>
             <a:fld id="{A0269D0A-075E-4EB0-8886-171E078C8796}" type="datetime1">
               <a:rPr lang="de-DE" smtClean="0"/>
-              <a:t>21.04.2024</a:t>
+              <a:t>01.05.2024</a:t>
             </a:fld>
             <a:endParaRPr lang="de-DE"/>
           </a:p>
@@ -5348,7 +5348,7 @@
           <a:p>
             <a:fld id="{AB066383-804D-4165-BE49-EE841EE88125}" type="datetime1">
               <a:rPr lang="de-DE" smtClean="0"/>
-              <a:t>21.04.2024</a:t>
+              <a:t>01.05.2024</a:t>
             </a:fld>
             <a:endParaRPr lang="de-DE"/>
           </a:p>
@@ -5871,7 +5871,7 @@
           <a:p>
             <a:fld id="{997919E3-4219-49E3-B0C2-4E01F6CC00B7}" type="datetime1">
               <a:rPr lang="de-DE" smtClean="0"/>
-              <a:t>21.04.2024</a:t>
+              <a:t>01.05.2024</a:t>
             </a:fld>
             <a:endParaRPr lang="de-DE"/>
           </a:p>
@@ -6965,7 +6965,7 @@
           <a:p>
             <a:fld id="{8DF361F7-99C5-4D1D-AF3E-CA2F03DFFDF7}" type="datetime1">
               <a:rPr lang="de-DE" smtClean="0"/>
-              <a:t>21.04.2024</a:t>
+              <a:t>01.05.2024</a:t>
             </a:fld>
             <a:endParaRPr lang="de-DE"/>
           </a:p>
@@ -7648,7 +7648,7 @@
           <a:p>
             <a:fld id="{35E9E24B-7E5D-4154-8FC8-DF2A71A00B95}" type="datetime1">
               <a:rPr lang="de-DE" smtClean="0"/>
-              <a:t>21.04.2024</a:t>
+              <a:t>01.05.2024</a:t>
             </a:fld>
             <a:endParaRPr lang="de-DE"/>
           </a:p>
@@ -7957,7 +7957,7 @@
           <a:p>
             <a:fld id="{ECAACF82-0D2D-4311-B4BF-451258A8E658}" type="datetime1">
               <a:rPr lang="de-DE" smtClean="0"/>
-              <a:t>21.04.2024</a:t>
+              <a:t>01.05.2024</a:t>
             </a:fld>
             <a:endParaRPr lang="de-DE"/>
           </a:p>
@@ -8726,7 +8726,7 @@
           <a:p>
             <a:fld id="{366F8EDF-E8BE-41B8-AC36-9DA59D54F43B}" type="datetime1">
               <a:rPr lang="de-DE" smtClean="0"/>
-              <a:t>21.04.2024</a:t>
+              <a:t>01.05.2024</a:t>
             </a:fld>
             <a:endParaRPr lang="de-DE"/>
           </a:p>
@@ -9710,7 +9710,7 @@
           <a:p>
             <a:fld id="{567DC678-D181-4598-A737-C83239D800AC}" type="datetime1">
               <a:rPr lang="de-DE" smtClean="0"/>
-              <a:t>21.04.2024</a:t>
+              <a:t>01.05.2024</a:t>
             </a:fld>
             <a:endParaRPr lang="de-DE"/>
           </a:p>
@@ -9929,7 +9929,7 @@
           <a:p>
             <a:fld id="{567DC678-D181-4598-A737-C83239D800AC}" type="datetime1">
               <a:rPr lang="de-DE" smtClean="0"/>
-              <a:t>21.04.2024</a:t>
+              <a:t>01.05.2024</a:t>
             </a:fld>
             <a:endParaRPr lang="de-DE"/>
           </a:p>
@@ -10131,7 +10131,7 @@
           <a:p>
             <a:fld id="{567DC678-D181-4598-A737-C83239D800AC}" type="datetime1">
               <a:rPr lang="de-DE" smtClean="0"/>
-              <a:t>21.04.2024</a:t>
+              <a:t>01.05.2024</a:t>
             </a:fld>
             <a:endParaRPr lang="de-DE"/>
           </a:p>
@@ -10343,7 +10343,7 @@
           <a:p>
             <a:fld id="{567DC678-D181-4598-A737-C83239D800AC}" type="datetime1">
               <a:rPr lang="de-DE" smtClean="0"/>
-              <a:t>21.04.2024</a:t>
+              <a:t>01.05.2024</a:t>
             </a:fld>
             <a:endParaRPr lang="de-DE"/>
           </a:p>
@@ -10431,7 +10431,7 @@
           <a:p>
             <a:fld id="{567DC678-D181-4598-A737-C83239D800AC}" type="datetime1">
               <a:rPr lang="de-DE" smtClean="0"/>
-              <a:t>21.04.2024</a:t>
+              <a:t>01.05.2024</a:t>
             </a:fld>
             <a:endParaRPr lang="de-DE"/>
           </a:p>
@@ -10588,7 +10588,7 @@
           <a:p>
             <a:fld id="{567DC678-D181-4598-A737-C83239D800AC}" type="datetime1">
               <a:rPr lang="de-DE" smtClean="0"/>
-              <a:t>21.04.2024</a:t>
+              <a:t>01.05.2024</a:t>
             </a:fld>
             <a:endParaRPr lang="de-DE"/>
           </a:p>
@@ -10820,7 +10820,7 @@
           <a:p>
             <a:fld id="{567DC678-D181-4598-A737-C83239D800AC}" type="datetime1">
               <a:rPr lang="de-DE" smtClean="0"/>
-              <a:t>21.04.2024</a:t>
+              <a:t>01.05.2024</a:t>
             </a:fld>
             <a:endParaRPr lang="de-DE"/>
           </a:p>
@@ -11148,7 +11148,7 @@
           <a:p>
             <a:fld id="{567DC678-D181-4598-A737-C83239D800AC}" type="datetime1">
               <a:rPr lang="de-DE" smtClean="0"/>
-              <a:t>21.04.2024</a:t>
+              <a:t>01.05.2024</a:t>
             </a:fld>
             <a:endParaRPr lang="de-DE"/>
           </a:p>
@@ -11371,7 +11371,7 @@
           <a:p>
             <a:fld id="{567DC678-D181-4598-A737-C83239D800AC}" type="datetime1">
               <a:rPr lang="de-DE" smtClean="0"/>
-              <a:t>21.04.2024</a:t>
+              <a:t>01.05.2024</a:t>
             </a:fld>
             <a:endParaRPr lang="de-DE"/>
           </a:p>
@@ -11865,7 +11865,7 @@
           <a:p>
             <a:fld id="{567DC678-D181-4598-A737-C83239D800AC}" type="datetime1">
               <a:rPr lang="de-DE" smtClean="0"/>
-              <a:t>21.04.2024</a:t>
+              <a:t>01.05.2024</a:t>
             </a:fld>
             <a:endParaRPr lang="de-DE"/>
           </a:p>
@@ -11981,7 +11981,7 @@
           <a:p>
             <a:fld id="{567DC678-D181-4598-A737-C83239D800AC}" type="datetime1">
               <a:rPr lang="de-DE" smtClean="0"/>
-              <a:t>21.04.2024</a:t>
+              <a:t>01.05.2024</a:t>
             </a:fld>
             <a:endParaRPr lang="de-DE"/>
           </a:p>
@@ -12201,7 +12201,7 @@
           <a:p>
             <a:fld id="{567DC678-D181-4598-A737-C83239D800AC}" type="datetime1">
               <a:rPr lang="de-DE" smtClean="0"/>
-              <a:t>21.04.2024</a:t>
+              <a:t>01.05.2024</a:t>
             </a:fld>
             <a:endParaRPr lang="de-DE"/>
           </a:p>
@@ -12479,7 +12479,7 @@
           <a:p>
             <a:fld id="{567DC678-D181-4598-A737-C83239D800AC}" type="datetime1">
               <a:rPr lang="de-DE" smtClean="0"/>
-              <a:t>21.04.2024</a:t>
+              <a:t>01.05.2024</a:t>
             </a:fld>
             <a:endParaRPr lang="de-DE"/>
           </a:p>
@@ -12764,7 +12764,7 @@
           <a:p>
             <a:fld id="{567DC678-D181-4598-A737-C83239D800AC}" type="datetime1">
               <a:rPr lang="de-DE" smtClean="0"/>
-              <a:t>21.04.2024</a:t>
+              <a:t>01.05.2024</a:t>
             </a:fld>
             <a:endParaRPr lang="de-DE"/>
           </a:p>
@@ -13024,7 +13024,7 @@
           <a:p>
             <a:fld id="{567DC678-D181-4598-A737-C83239D800AC}" type="datetime1">
               <a:rPr lang="de-DE" smtClean="0"/>
-              <a:t>21.04.2024</a:t>
+              <a:t>01.05.2024</a:t>
             </a:fld>
             <a:endParaRPr lang="de-DE"/>
           </a:p>
@@ -13300,7 +13300,7 @@
           <a:p>
             <a:fld id="{567DC678-D181-4598-A737-C83239D800AC}" type="datetime1">
               <a:rPr lang="de-DE" smtClean="0"/>
-              <a:t>21.04.2024</a:t>
+              <a:t>01.05.2024</a:t>
             </a:fld>
             <a:endParaRPr lang="de-DE"/>
           </a:p>
@@ -13560,7 +13560,7 @@
           <a:p>
             <a:fld id="{567DC678-D181-4598-A737-C83239D800AC}" type="datetime1">
               <a:rPr lang="de-DE" smtClean="0"/>
-              <a:t>21.04.2024</a:t>
+              <a:t>01.05.2024</a:t>
             </a:fld>
             <a:endParaRPr lang="de-DE"/>
           </a:p>
@@ -13834,7 +13834,7 @@
           <a:p>
             <a:fld id="{567DC678-D181-4598-A737-C83239D800AC}" type="datetime1">
               <a:rPr lang="de-DE" smtClean="0"/>
-              <a:t>21.04.2024</a:t>
+              <a:t>01.05.2024</a:t>
             </a:fld>
             <a:endParaRPr lang="de-DE"/>
           </a:p>
@@ -14078,7 +14078,7 @@
           <a:p>
             <a:fld id="{567DC678-D181-4598-A737-C83239D800AC}" type="datetime1">
               <a:rPr lang="de-DE" smtClean="0"/>
-              <a:t>21.04.2024</a:t>
+              <a:t>01.05.2024</a:t>
             </a:fld>
             <a:endParaRPr lang="de-DE"/>
           </a:p>
@@ -14350,7 +14350,7 @@
           <a:p>
             <a:fld id="{567DC678-D181-4598-A737-C83239D800AC}" type="datetime1">
               <a:rPr lang="de-DE" smtClean="0"/>
-              <a:t>21.04.2024</a:t>
+              <a:t>01.05.2024</a:t>
             </a:fld>
             <a:endParaRPr lang="de-DE"/>
           </a:p>
@@ -14774,7 +14774,7 @@
           <a:p>
             <a:fld id="{567DC678-D181-4598-A737-C83239D800AC}" type="datetime1">
               <a:rPr lang="de-DE" smtClean="0"/>
-              <a:t>21.04.2024</a:t>
+              <a:t>01.05.2024</a:t>
             </a:fld>
             <a:endParaRPr lang="de-DE"/>
           </a:p>
@@ -14922,7 +14922,7 @@
           <a:p>
             <a:fld id="{567DC678-D181-4598-A737-C83239D800AC}" type="datetime1">
               <a:rPr lang="de-DE" smtClean="0"/>
-              <a:t>21.04.2024</a:t>
+              <a:t>01.05.2024</a:t>
             </a:fld>
             <a:endParaRPr lang="de-DE"/>
           </a:p>
@@ -15180,7 +15180,7 @@
           <a:p>
             <a:fld id="{567DC678-D181-4598-A737-C83239D800AC}" type="datetime1">
               <a:rPr lang="de-DE" smtClean="0"/>
-              <a:t>21.04.2024</a:t>
+              <a:t>01.05.2024</a:t>
             </a:fld>
             <a:endParaRPr lang="de-DE"/>
           </a:p>
@@ -15452,7 +15452,7 @@
           <a:p>
             <a:fld id="{567DC678-D181-4598-A737-C83239D800AC}" type="datetime1">
               <a:rPr lang="de-DE" smtClean="0"/>
-              <a:t>21.04.2024</a:t>
+              <a:t>01.05.2024</a:t>
             </a:fld>
             <a:endParaRPr lang="de-DE"/>
           </a:p>
@@ -15738,7 +15738,7 @@
           <a:p>
             <a:fld id="{567DC678-D181-4598-A737-C83239D800AC}" type="datetime1">
               <a:rPr lang="de-DE" smtClean="0"/>
-              <a:t>21.04.2024</a:t>
+              <a:t>01.05.2024</a:t>
             </a:fld>
             <a:endParaRPr lang="de-DE"/>
           </a:p>
@@ -16038,7 +16038,7 @@
           <a:p>
             <a:fld id="{567DC678-D181-4598-A737-C83239D800AC}" type="datetime1">
               <a:rPr lang="de-DE" smtClean="0"/>
-              <a:t>21.04.2024</a:t>
+              <a:t>01.05.2024</a:t>
             </a:fld>
             <a:endParaRPr lang="de-DE"/>
           </a:p>
@@ -16194,7 +16194,7 @@
           <a:p>
             <a:fld id="{567DC678-D181-4598-A737-C83239D800AC}" type="datetime1">
               <a:rPr lang="de-DE" smtClean="0"/>
-              <a:t>21.04.2024</a:t>
+              <a:t>01.05.2024</a:t>
             </a:fld>
             <a:endParaRPr lang="de-DE"/>
           </a:p>
@@ -16355,7 +16355,7 @@
           <a:p>
             <a:fld id="{567DC678-D181-4598-A737-C83239D800AC}" type="datetime1">
               <a:rPr lang="de-DE" smtClean="0"/>
-              <a:t>21.04.2024</a:t>
+              <a:t>01.05.2024</a:t>
             </a:fld>
             <a:endParaRPr lang="de-DE"/>
           </a:p>
@@ -16544,7 +16544,7 @@
           <a:p>
             <a:fld id="{567DC678-D181-4598-A737-C83239D800AC}" type="datetime1">
               <a:rPr lang="de-DE" smtClean="0"/>
-              <a:t>21.04.2024</a:t>
+              <a:t>01.05.2024</a:t>
             </a:fld>
             <a:endParaRPr lang="de-DE"/>
           </a:p>
@@ -16758,7 +16758,7 @@
           <a:p>
             <a:fld id="{567DC678-D181-4598-A737-C83239D800AC}" type="datetime1">
               <a:rPr lang="de-DE" smtClean="0"/>
-              <a:t>21.04.2024</a:t>
+              <a:t>01.05.2024</a:t>
             </a:fld>
             <a:endParaRPr lang="de-DE"/>
           </a:p>
@@ -17000,7 +17000,7 @@
           <a:p>
             <a:fld id="{567DC678-D181-4598-A737-C83239D800AC}" type="datetime1">
               <a:rPr lang="de-DE" smtClean="0"/>
-              <a:t>21.04.2024</a:t>
+              <a:t>01.05.2024</a:t>
             </a:fld>
             <a:endParaRPr lang="de-DE"/>
           </a:p>
@@ -17170,7 +17170,7 @@
           <a:p>
             <a:fld id="{567DC678-D181-4598-A737-C83239D800AC}" type="datetime1">
               <a:rPr lang="de-DE" smtClean="0"/>
-              <a:t>21.04.2024</a:t>
+              <a:t>01.05.2024</a:t>
             </a:fld>
             <a:endParaRPr lang="de-DE"/>
           </a:p>
@@ -17358,7 +17358,7 @@
           <a:p>
             <a:fld id="{567DC678-D181-4598-A737-C83239D800AC}" type="datetime1">
               <a:rPr lang="de-DE" smtClean="0"/>
-              <a:t>21.04.2024</a:t>
+              <a:t>01.05.2024</a:t>
             </a:fld>
             <a:endParaRPr lang="de-DE"/>
           </a:p>
@@ -17542,7 +17542,7 @@
           <a:p>
             <a:fld id="{567DC678-D181-4598-A737-C83239D800AC}" type="datetime1">
               <a:rPr lang="de-DE" smtClean="0"/>
-              <a:t>21.04.2024</a:t>
+              <a:t>01.05.2024</a:t>
             </a:fld>
             <a:endParaRPr lang="de-DE"/>
           </a:p>
@@ -17850,7 +17850,7 @@
           <a:p>
             <a:fld id="{567DC678-D181-4598-A737-C83239D800AC}" type="datetime1">
               <a:rPr lang="de-DE" smtClean="0"/>
-              <a:t>21.04.2024</a:t>
+              <a:t>01.05.2024</a:t>
             </a:fld>
             <a:endParaRPr lang="de-DE"/>
           </a:p>
@@ -17970,7 +17970,7 @@
           <a:p>
             <a:fld id="{567DC678-D181-4598-A737-C83239D800AC}" type="datetime1">
               <a:rPr lang="de-DE" smtClean="0"/>
-              <a:t>21.04.2024</a:t>
+              <a:t>01.05.2024</a:t>
             </a:fld>
             <a:endParaRPr lang="de-DE"/>
           </a:p>
@@ -18278,7 +18278,7 @@
           <a:p>
             <a:fld id="{567DC678-D181-4598-A737-C83239D800AC}" type="datetime1">
               <a:rPr lang="de-DE" smtClean="0"/>
-              <a:t>21.04.2024</a:t>
+              <a:t>01.05.2024</a:t>
             </a:fld>
             <a:endParaRPr lang="de-DE"/>
           </a:p>
@@ -18398,7 +18398,7 @@
           <a:p>
             <a:fld id="{567DC678-D181-4598-A737-C83239D800AC}" type="datetime1">
               <a:rPr lang="de-DE" smtClean="0"/>
-              <a:t>21.04.2024</a:t>
+              <a:t>01.05.2024</a:t>
             </a:fld>
             <a:endParaRPr lang="de-DE"/>
           </a:p>
@@ -18881,7 +18881,7 @@
           <a:p>
             <a:fld id="{567DC678-D181-4598-A737-C83239D800AC}" type="datetime1">
               <a:rPr lang="de-DE" smtClean="0"/>
-              <a:t>21.04.2024</a:t>
+              <a:t>01.05.2024</a:t>
             </a:fld>
             <a:endParaRPr lang="de-DE"/>
           </a:p>
@@ -19001,7 +19001,7 @@
           <a:p>
             <a:fld id="{567DC678-D181-4598-A737-C83239D800AC}" type="datetime1">
               <a:rPr lang="de-DE" smtClean="0"/>
-              <a:t>21.04.2024</a:t>
+              <a:t>01.05.2024</a:t>
             </a:fld>
             <a:endParaRPr lang="de-DE"/>
           </a:p>
@@ -19151,7 +19151,7 @@
           <a:p>
             <a:fld id="{567DC678-D181-4598-A737-C83239D800AC}" type="datetime1">
               <a:rPr lang="de-DE" smtClean="0"/>
-              <a:t>21.04.2024</a:t>
+              <a:t>01.05.2024</a:t>
             </a:fld>
             <a:endParaRPr lang="de-DE"/>
           </a:p>
@@ -19397,7 +19397,7 @@
           <a:p>
             <a:fld id="{567DC678-D181-4598-A737-C83239D800AC}" type="datetime1">
               <a:rPr lang="de-DE" smtClean="0"/>
-              <a:t>21.04.2024</a:t>
+              <a:t>01.05.2024</a:t>
             </a:fld>
             <a:endParaRPr lang="de-DE"/>
           </a:p>
@@ -19705,7 +19705,7 @@
           <a:p>
             <a:fld id="{567DC678-D181-4598-A737-C83239D800AC}" type="datetime1">
               <a:rPr lang="de-DE" smtClean="0"/>
-              <a:t>21.04.2024</a:t>
+              <a:t>01.05.2024</a:t>
             </a:fld>
             <a:endParaRPr lang="de-DE"/>
           </a:p>
@@ -20090,7 +20090,7 @@
           <a:p>
             <a:fld id="{567DC678-D181-4598-A737-C83239D800AC}" type="datetime1">
               <a:rPr lang="de-DE" smtClean="0"/>
-              <a:t>21.04.2024</a:t>
+              <a:t>01.05.2024</a:t>
             </a:fld>
             <a:endParaRPr lang="de-DE"/>
           </a:p>
@@ -20210,7 +20210,7 @@
           <a:p>
             <a:fld id="{567DC678-D181-4598-A737-C83239D800AC}" type="datetime1">
               <a:rPr lang="de-DE" smtClean="0"/>
-              <a:t>21.04.2024</a:t>
+              <a:t>01.05.2024</a:t>
             </a:fld>
             <a:endParaRPr lang="de-DE"/>
           </a:p>
@@ -20360,7 +20360,7 @@
           <a:p>
             <a:fld id="{567DC678-D181-4598-A737-C83239D800AC}" type="datetime1">
               <a:rPr lang="de-DE" smtClean="0"/>
-              <a:t>21.04.2024</a:t>
+              <a:t>01.05.2024</a:t>
             </a:fld>
             <a:endParaRPr lang="de-DE"/>
           </a:p>
@@ -20601,7 +20601,7 @@
           <a:p>
             <a:fld id="{567DC678-D181-4598-A737-C83239D800AC}" type="datetime1">
               <a:rPr lang="de-DE" smtClean="0"/>
-              <a:t>21.04.2024</a:t>
+              <a:t>01.05.2024</a:t>
             </a:fld>
             <a:endParaRPr lang="de-DE"/>
           </a:p>
@@ -20914,7 +20914,7 @@
           <a:p>
             <a:fld id="{567DC678-D181-4598-A737-C83239D800AC}" type="datetime1">
               <a:rPr lang="de-DE" smtClean="0"/>
-              <a:t>21.04.2024</a:t>
+              <a:t>01.05.2024</a:t>
             </a:fld>
             <a:endParaRPr lang="de-DE"/>
           </a:p>
@@ -21284,7 +21284,7 @@
           <a:p>
             <a:fld id="{567DC678-D181-4598-A737-C83239D800AC}" type="datetime1">
               <a:rPr lang="de-DE" smtClean="0"/>
-              <a:t>21.04.2024</a:t>
+              <a:t>01.05.2024</a:t>
             </a:fld>
             <a:endParaRPr lang="de-DE"/>
           </a:p>
@@ -21731,7 +21731,7 @@
           <a:p>
             <a:fld id="{567DC678-D181-4598-A737-C83239D800AC}" type="datetime1">
               <a:rPr lang="de-DE" smtClean="0"/>
-              <a:t>21.04.2024</a:t>
+              <a:t>01.05.2024</a:t>
             </a:fld>
             <a:endParaRPr lang="de-DE"/>
           </a:p>
@@ -22081,7 +22081,7 @@
           <a:p>
             <a:fld id="{567DC678-D181-4598-A737-C83239D800AC}" type="datetime1">
               <a:rPr lang="de-DE" smtClean="0"/>
-              <a:t>21.04.2024</a:t>
+              <a:t>01.05.2024</a:t>
             </a:fld>
             <a:endParaRPr lang="de-DE"/>
           </a:p>
@@ -22479,7 +22479,7 @@
           <a:p>
             <a:fld id="{567DC678-D181-4598-A737-C83239D800AC}" type="datetime1">
               <a:rPr lang="de-DE" smtClean="0"/>
-              <a:t>21.04.2024</a:t>
+              <a:t>01.05.2024</a:t>
             </a:fld>
             <a:endParaRPr lang="de-DE"/>
           </a:p>
@@ -22864,7 +22864,7 @@
           <a:p>
             <a:fld id="{567DC678-D181-4598-A737-C83239D800AC}" type="datetime1">
               <a:rPr lang="de-DE" smtClean="0"/>
-              <a:t>21.04.2024</a:t>
+              <a:t>01.05.2024</a:t>
             </a:fld>
             <a:endParaRPr lang="de-DE"/>
           </a:p>
@@ -23266,7 +23266,7 @@
           <a:p>
             <a:fld id="{567DC678-D181-4598-A737-C83239D800AC}" type="datetime1">
               <a:rPr lang="de-DE" smtClean="0"/>
-              <a:t>21.04.2024</a:t>
+              <a:t>01.05.2024</a:t>
             </a:fld>
             <a:endParaRPr lang="de-DE"/>
           </a:p>
@@ -23418,7 +23418,7 @@
           <a:p>
             <a:fld id="{567DC678-D181-4598-A737-C83239D800AC}" type="datetime1">
               <a:rPr lang="de-DE" smtClean="0"/>
-              <a:t>21.04.2024</a:t>
+              <a:t>01.05.2024</a:t>
             </a:fld>
             <a:endParaRPr lang="de-DE"/>
           </a:p>
@@ -23821,7 +23821,7 @@
           <a:p>
             <a:fld id="{567DC678-D181-4598-A737-C83239D800AC}" type="datetime1">
               <a:rPr lang="de-DE" smtClean="0"/>
-              <a:t>21.04.2024</a:t>
+              <a:t>01.05.2024</a:t>
             </a:fld>
             <a:endParaRPr lang="de-DE"/>
           </a:p>
@@ -24221,7 +24221,7 @@
           <a:p>
             <a:fld id="{567DC678-D181-4598-A737-C83239D800AC}" type="datetime1">
               <a:rPr lang="de-DE" smtClean="0"/>
-              <a:t>21.04.2024</a:t>
+              <a:t>01.05.2024</a:t>
             </a:fld>
             <a:endParaRPr lang="de-DE"/>
           </a:p>
@@ -24689,7 +24689,7 @@
           <a:p>
             <a:fld id="{567DC678-D181-4598-A737-C83239D800AC}" type="datetime1">
               <a:rPr lang="de-DE" smtClean="0"/>
-              <a:t>21.04.2024</a:t>
+              <a:t>01.05.2024</a:t>
             </a:fld>
             <a:endParaRPr lang="de-DE"/>
           </a:p>
@@ -25172,7 +25172,7 @@
           <a:p>
             <a:fld id="{567DC678-D181-4598-A737-C83239D800AC}" type="datetime1">
               <a:rPr lang="de-DE" smtClean="0"/>
-              <a:t>21.04.2024</a:t>
+              <a:t>01.05.2024</a:t>
             </a:fld>
             <a:endParaRPr lang="de-DE"/>
           </a:p>
@@ -25578,7 +25578,7 @@
           <a:p>
             <a:fld id="{567DC678-D181-4598-A737-C83239D800AC}" type="datetime1">
               <a:rPr lang="de-DE" smtClean="0"/>
-              <a:t>21.04.2024</a:t>
+              <a:t>01.05.2024</a:t>
             </a:fld>
             <a:endParaRPr lang="de-DE"/>
           </a:p>
@@ -25730,7 +25730,7 @@
           <a:p>
             <a:fld id="{E8277138-AE99-4B23-B221-2DCA1A62B56B}" type="datetime1">
               <a:rPr lang="de-DE" smtClean="0"/>
-              <a:t>21.04.2024</a:t>
+              <a:t>01.05.2024</a:t>
             </a:fld>
             <a:endParaRPr lang="de-DE"/>
           </a:p>
@@ -25912,7 +25912,7 @@
           <a:p>
             <a:fld id="{E8277138-AE99-4B23-B221-2DCA1A62B56B}" type="datetime1">
               <a:rPr lang="de-DE" smtClean="0"/>
-              <a:t>21.04.2024</a:t>
+              <a:t>01.05.2024</a:t>
             </a:fld>
             <a:endParaRPr lang="de-DE"/>
           </a:p>
@@ -26109,7 +26109,7 @@
           <a:p>
             <a:fld id="{E8277138-AE99-4B23-B221-2DCA1A62B56B}" type="datetime1">
               <a:rPr lang="de-DE" smtClean="0"/>
-              <a:t>21.04.2024</a:t>
+              <a:t>01.05.2024</a:t>
             </a:fld>
             <a:endParaRPr lang="de-DE"/>
           </a:p>
@@ -26366,7 +26366,7 @@
             <a:r>
               <a:rPr lang="de-DE" dirty="0">
                 <a:solidFill>
-                  <a:srgbClr val="7030A0"/>
+                  <a:srgbClr val="BF00FF"/>
                 </a:solidFill>
                 <a:sym typeface="Wingdings" panose="05000000000000000000" pitchFamily="2" charset="2"/>
               </a:rPr>
@@ -26412,7 +26412,7 @@
           <a:p>
             <a:fld id="{E8277138-AE99-4B23-B221-2DCA1A62B56B}" type="datetime1">
               <a:rPr lang="de-DE" smtClean="0"/>
-              <a:t>21.04.2024</a:t>
+              <a:t>01.05.2024</a:t>
             </a:fld>
             <a:endParaRPr lang="de-DE"/>
           </a:p>
@@ -26664,7 +26664,7 @@
           <a:p>
             <a:fld id="{E8277138-AE99-4B23-B221-2DCA1A62B56B}" type="datetime1">
               <a:rPr lang="de-DE" smtClean="0"/>
-              <a:t>21.04.2024</a:t>
+              <a:t>01.05.2024</a:t>
             </a:fld>
             <a:endParaRPr lang="de-DE"/>
           </a:p>
@@ -26826,7 +26826,7 @@
           <a:p>
             <a:fld id="{567DC678-D181-4598-A737-C83239D800AC}" type="datetime1">
               <a:rPr lang="de-DE" smtClean="0"/>
-              <a:t>21.04.2024</a:t>
+              <a:t>01.05.2024</a:t>
             </a:fld>
             <a:endParaRPr lang="de-DE"/>
           </a:p>
@@ -27016,7 +27016,7 @@
           <a:p>
             <a:fld id="{E8277138-AE99-4B23-B221-2DCA1A62B56B}" type="datetime1">
               <a:rPr lang="de-DE" smtClean="0"/>
-              <a:t>21.04.2024</a:t>
+              <a:t>01.05.2024</a:t>
             </a:fld>
             <a:endParaRPr lang="de-DE"/>
           </a:p>
@@ -27188,7 +27188,7 @@
           <a:p>
             <a:fld id="{567DC678-D181-4598-A737-C83239D800AC}" type="datetime1">
               <a:rPr lang="de-DE" smtClean="0"/>
-              <a:t>21.04.2024</a:t>
+              <a:t>01.05.2024</a:t>
             </a:fld>
             <a:endParaRPr lang="de-DE"/>
           </a:p>
@@ -27383,7 +27383,7 @@
           <a:p>
             <a:fld id="{567DC678-D181-4598-A737-C83239D800AC}" type="datetime1">
               <a:rPr lang="de-DE" smtClean="0"/>
-              <a:t>21.04.2024</a:t>
+              <a:t>01.05.2024</a:t>
             </a:fld>
             <a:endParaRPr lang="de-DE"/>
           </a:p>

</xml_diff>